<commit_message>
Add sac time explanations
</commit_message>
<xml_diff>
--- a/Lab1/sac_time.pptx
+++ b/Lab1/sac_time.pptx
@@ -2985,7 +2985,7 @@
         </p:nvSpPr>
         <p:spPr>
           <a:xfrm rot="5400000">
-            <a:off x="1818365" y="2147297"/>
+            <a:off x="1818365" y="1842497"/>
             <a:ext cx="935586" cy="2957323"/>
           </a:xfrm>
           <a:prstGeom prst="leftBrace">
@@ -3041,7 +3041,7 @@
         </p:nvSpPr>
         <p:spPr>
           <a:xfrm rot="5400000">
-            <a:off x="4641434" y="2311687"/>
+            <a:off x="4641434" y="2006887"/>
             <a:ext cx="912885" cy="2605841"/>
           </a:xfrm>
           <a:prstGeom prst="leftBrace">
@@ -3097,7 +3097,7 @@
         </p:nvSpPr>
         <p:spPr>
           <a:xfrm rot="5400000">
-            <a:off x="6900440" y="-126403"/>
+            <a:off x="6900440" y="-431203"/>
             <a:ext cx="1089383" cy="7315469"/>
           </a:xfrm>
           <a:prstGeom prst="leftBrace">
@@ -3153,7 +3153,7 @@
         </p:nvSpPr>
         <p:spPr>
           <a:xfrm>
-            <a:off x="768244" y="2130335"/>
+            <a:off x="768244" y="1825535"/>
             <a:ext cx="108000" cy="108000"/>
           </a:xfrm>
           <a:prstGeom prst="ellipse">
@@ -3205,7 +3205,7 @@
         </p:nvSpPr>
         <p:spPr>
           <a:xfrm>
-            <a:off x="990494" y="2130335"/>
+            <a:off x="990494" y="1825535"/>
             <a:ext cx="108000" cy="108000"/>
           </a:xfrm>
           <a:prstGeom prst="ellipse">
@@ -3257,7 +3257,7 @@
         </p:nvSpPr>
         <p:spPr>
           <a:xfrm>
-            <a:off x="1209568" y="2130335"/>
+            <a:off x="1209568" y="1825535"/>
             <a:ext cx="108000" cy="108000"/>
           </a:xfrm>
           <a:prstGeom prst="ellipse">
@@ -3309,7 +3309,7 @@
         </p:nvSpPr>
         <p:spPr>
           <a:xfrm>
-            <a:off x="1428642" y="2130335"/>
+            <a:off x="1428642" y="1825535"/>
             <a:ext cx="108000" cy="108000"/>
           </a:xfrm>
           <a:prstGeom prst="ellipse">
@@ -3361,7 +3361,7 @@
         </p:nvSpPr>
         <p:spPr>
           <a:xfrm>
-            <a:off x="1650892" y="2130335"/>
+            <a:off x="1650892" y="1825535"/>
             <a:ext cx="108000" cy="108000"/>
           </a:xfrm>
           <a:prstGeom prst="ellipse">
@@ -3413,7 +3413,7 @@
         </p:nvSpPr>
         <p:spPr>
           <a:xfrm>
-            <a:off x="1869966" y="2130335"/>
+            <a:off x="1869966" y="1825535"/>
             <a:ext cx="108000" cy="108000"/>
           </a:xfrm>
           <a:prstGeom prst="ellipse">
@@ -3465,7 +3465,7 @@
         </p:nvSpPr>
         <p:spPr>
           <a:xfrm>
-            <a:off x="2089040" y="2130335"/>
+            <a:off x="2089040" y="1825535"/>
             <a:ext cx="108000" cy="108000"/>
           </a:xfrm>
           <a:prstGeom prst="ellipse">
@@ -3517,7 +3517,7 @@
         </p:nvSpPr>
         <p:spPr>
           <a:xfrm>
-            <a:off x="2311290" y="2130335"/>
+            <a:off x="2311290" y="1825535"/>
             <a:ext cx="108000" cy="108000"/>
           </a:xfrm>
           <a:prstGeom prst="ellipse">
@@ -3569,7 +3569,7 @@
         </p:nvSpPr>
         <p:spPr>
           <a:xfrm>
-            <a:off x="2530364" y="2130335"/>
+            <a:off x="2530364" y="1825535"/>
             <a:ext cx="108000" cy="108000"/>
           </a:xfrm>
           <a:prstGeom prst="ellipse">
@@ -3621,7 +3621,7 @@
         </p:nvSpPr>
         <p:spPr>
           <a:xfrm>
-            <a:off x="2749438" y="2130335"/>
+            <a:off x="2749438" y="1825535"/>
             <a:ext cx="108000" cy="108000"/>
           </a:xfrm>
           <a:prstGeom prst="ellipse">
@@ -3673,7 +3673,7 @@
         </p:nvSpPr>
         <p:spPr>
           <a:xfrm>
-            <a:off x="2971688" y="2130335"/>
+            <a:off x="2971688" y="1825535"/>
             <a:ext cx="108000" cy="108000"/>
           </a:xfrm>
           <a:prstGeom prst="ellipse">
@@ -3725,7 +3725,7 @@
         </p:nvSpPr>
         <p:spPr>
           <a:xfrm>
-            <a:off x="3190762" y="2130335"/>
+            <a:off x="3190762" y="1825535"/>
             <a:ext cx="108000" cy="108000"/>
           </a:xfrm>
           <a:prstGeom prst="ellipse">
@@ -3777,7 +3777,7 @@
         </p:nvSpPr>
         <p:spPr>
           <a:xfrm>
-            <a:off x="3403500" y="2130335"/>
+            <a:off x="3403500" y="1825535"/>
             <a:ext cx="108000" cy="108000"/>
           </a:xfrm>
           <a:prstGeom prst="ellipse">
@@ -3829,7 +3829,7 @@
         </p:nvSpPr>
         <p:spPr>
           <a:xfrm>
-            <a:off x="3625750" y="2130335"/>
+            <a:off x="3625750" y="1825535"/>
             <a:ext cx="108000" cy="108000"/>
           </a:xfrm>
           <a:prstGeom prst="ellipse">
@@ -3881,7 +3881,7 @@
         </p:nvSpPr>
         <p:spPr>
           <a:xfrm>
-            <a:off x="3844824" y="2130335"/>
+            <a:off x="3844824" y="1825535"/>
             <a:ext cx="108000" cy="108000"/>
           </a:xfrm>
           <a:prstGeom prst="ellipse">
@@ -3933,7 +3933,7 @@
         </p:nvSpPr>
         <p:spPr>
           <a:xfrm>
-            <a:off x="4063898" y="2130335"/>
+            <a:off x="4063898" y="1825535"/>
             <a:ext cx="108000" cy="108000"/>
           </a:xfrm>
           <a:prstGeom prst="ellipse">
@@ -3985,7 +3985,7 @@
         </p:nvSpPr>
         <p:spPr>
           <a:xfrm>
-            <a:off x="4286148" y="2130335"/>
+            <a:off x="4286148" y="1825535"/>
             <a:ext cx="108000" cy="108000"/>
           </a:xfrm>
           <a:prstGeom prst="ellipse">
@@ -4037,7 +4037,7 @@
         </p:nvSpPr>
         <p:spPr>
           <a:xfrm>
-            <a:off x="4505222" y="2130335"/>
+            <a:off x="4505222" y="1825535"/>
             <a:ext cx="108000" cy="108000"/>
           </a:xfrm>
           <a:prstGeom prst="ellipse">
@@ -4089,7 +4089,7 @@
         </p:nvSpPr>
         <p:spPr>
           <a:xfrm>
-            <a:off x="4724296" y="2130335"/>
+            <a:off x="4724296" y="1825535"/>
             <a:ext cx="108000" cy="108000"/>
           </a:xfrm>
           <a:prstGeom prst="ellipse">
@@ -4141,7 +4141,7 @@
         </p:nvSpPr>
         <p:spPr>
           <a:xfrm>
-            <a:off x="4946546" y="2130335"/>
+            <a:off x="4946546" y="1825535"/>
             <a:ext cx="108000" cy="108000"/>
           </a:xfrm>
           <a:prstGeom prst="ellipse">
@@ -4193,7 +4193,7 @@
         </p:nvSpPr>
         <p:spPr>
           <a:xfrm>
-            <a:off x="5165620" y="2130335"/>
+            <a:off x="5165620" y="1825535"/>
             <a:ext cx="108000" cy="108000"/>
           </a:xfrm>
           <a:prstGeom prst="ellipse">
@@ -4245,7 +4245,7 @@
         </p:nvSpPr>
         <p:spPr>
           <a:xfrm>
-            <a:off x="5384694" y="2130335"/>
+            <a:off x="5384694" y="1825535"/>
             <a:ext cx="108000" cy="108000"/>
           </a:xfrm>
           <a:prstGeom prst="ellipse">
@@ -4297,7 +4297,7 @@
         </p:nvSpPr>
         <p:spPr>
           <a:xfrm>
-            <a:off x="5606944" y="2130335"/>
+            <a:off x="5606944" y="1825535"/>
             <a:ext cx="108000" cy="108000"/>
           </a:xfrm>
           <a:prstGeom prst="ellipse">
@@ -4349,7 +4349,7 @@
         </p:nvSpPr>
         <p:spPr>
           <a:xfrm>
-            <a:off x="5826018" y="2130335"/>
+            <a:off x="5826018" y="1825535"/>
             <a:ext cx="108000" cy="108000"/>
           </a:xfrm>
           <a:prstGeom prst="ellipse">
@@ -4401,7 +4401,7 @@
         </p:nvSpPr>
         <p:spPr>
           <a:xfrm>
-            <a:off x="6045092" y="2130335"/>
+            <a:off x="6045092" y="1825535"/>
             <a:ext cx="108000" cy="108000"/>
           </a:xfrm>
           <a:prstGeom prst="ellipse">
@@ -4453,7 +4453,7 @@
         </p:nvSpPr>
         <p:spPr>
           <a:xfrm>
-            <a:off x="6267342" y="2130335"/>
+            <a:off x="6267342" y="1825535"/>
             <a:ext cx="108000" cy="108000"/>
           </a:xfrm>
           <a:prstGeom prst="ellipse">
@@ -4505,7 +4505,7 @@
         </p:nvSpPr>
         <p:spPr>
           <a:xfrm>
-            <a:off x="6486416" y="2130335"/>
+            <a:off x="6486416" y="1825535"/>
             <a:ext cx="108000" cy="108000"/>
           </a:xfrm>
           <a:prstGeom prst="ellipse">
@@ -4557,7 +4557,7 @@
         </p:nvSpPr>
         <p:spPr>
           <a:xfrm>
-            <a:off x="6705490" y="2130335"/>
+            <a:off x="6705490" y="1825535"/>
             <a:ext cx="108000" cy="108000"/>
           </a:xfrm>
           <a:prstGeom prst="ellipse">
@@ -4609,7 +4609,7 @@
         </p:nvSpPr>
         <p:spPr>
           <a:xfrm>
-            <a:off x="6927740" y="2130335"/>
+            <a:off x="6927740" y="1825535"/>
             <a:ext cx="108000" cy="108000"/>
           </a:xfrm>
           <a:prstGeom prst="ellipse">
@@ -4661,7 +4661,7 @@
         </p:nvSpPr>
         <p:spPr>
           <a:xfrm>
-            <a:off x="7146814" y="2130335"/>
+            <a:off x="7146814" y="1825535"/>
             <a:ext cx="108000" cy="108000"/>
           </a:xfrm>
           <a:prstGeom prst="ellipse">
@@ -4713,7 +4713,7 @@
         </p:nvSpPr>
         <p:spPr>
           <a:xfrm>
-            <a:off x="7365888" y="2130335"/>
+            <a:off x="7365888" y="1825535"/>
             <a:ext cx="108000" cy="108000"/>
           </a:xfrm>
           <a:prstGeom prst="ellipse">
@@ -4765,7 +4765,7 @@
         </p:nvSpPr>
         <p:spPr>
           <a:xfrm>
-            <a:off x="7588138" y="2130335"/>
+            <a:off x="7588138" y="1825535"/>
             <a:ext cx="108000" cy="108000"/>
           </a:xfrm>
           <a:prstGeom prst="ellipse">
@@ -4817,7 +4817,7 @@
         </p:nvSpPr>
         <p:spPr>
           <a:xfrm>
-            <a:off x="7807212" y="2130335"/>
+            <a:off x="7807212" y="1825535"/>
             <a:ext cx="108000" cy="108000"/>
           </a:xfrm>
           <a:prstGeom prst="ellipse">
@@ -4869,7 +4869,7 @@
         </p:nvSpPr>
         <p:spPr>
           <a:xfrm>
-            <a:off x="8026286" y="2130335"/>
+            <a:off x="8026286" y="1825535"/>
             <a:ext cx="108000" cy="108000"/>
           </a:xfrm>
           <a:prstGeom prst="ellipse">
@@ -4921,7 +4921,7 @@
         </p:nvSpPr>
         <p:spPr>
           <a:xfrm>
-            <a:off x="8248536" y="2130335"/>
+            <a:off x="8248536" y="1825535"/>
             <a:ext cx="108000" cy="108000"/>
           </a:xfrm>
           <a:prstGeom prst="ellipse">
@@ -4973,7 +4973,7 @@
         </p:nvSpPr>
         <p:spPr>
           <a:xfrm>
-            <a:off x="8467610" y="2130335"/>
+            <a:off x="8467610" y="1825535"/>
             <a:ext cx="108000" cy="108000"/>
           </a:xfrm>
           <a:prstGeom prst="ellipse">
@@ -5025,7 +5025,7 @@
         </p:nvSpPr>
         <p:spPr>
           <a:xfrm>
-            <a:off x="8680348" y="2130335"/>
+            <a:off x="8680348" y="1825535"/>
             <a:ext cx="108000" cy="108000"/>
           </a:xfrm>
           <a:prstGeom prst="ellipse">
@@ -5077,7 +5077,7 @@
         </p:nvSpPr>
         <p:spPr>
           <a:xfrm>
-            <a:off x="8902598" y="2130335"/>
+            <a:off x="8902598" y="1825535"/>
             <a:ext cx="108000" cy="108000"/>
           </a:xfrm>
           <a:prstGeom prst="ellipse">
@@ -5129,7 +5129,7 @@
         </p:nvSpPr>
         <p:spPr>
           <a:xfrm>
-            <a:off x="9121672" y="2130335"/>
+            <a:off x="9121672" y="1825535"/>
             <a:ext cx="108000" cy="108000"/>
           </a:xfrm>
           <a:prstGeom prst="ellipse">
@@ -5181,7 +5181,7 @@
         </p:nvSpPr>
         <p:spPr>
           <a:xfrm>
-            <a:off x="9340746" y="2130335"/>
+            <a:off x="9340746" y="1825535"/>
             <a:ext cx="108000" cy="108000"/>
           </a:xfrm>
           <a:prstGeom prst="ellipse">
@@ -5233,7 +5233,7 @@
         </p:nvSpPr>
         <p:spPr>
           <a:xfrm>
-            <a:off x="9562996" y="2130335"/>
+            <a:off x="9562996" y="1825535"/>
             <a:ext cx="108000" cy="108000"/>
           </a:xfrm>
           <a:prstGeom prst="ellipse">
@@ -5285,7 +5285,7 @@
         </p:nvSpPr>
         <p:spPr>
           <a:xfrm>
-            <a:off x="9782070" y="2130335"/>
+            <a:off x="9782070" y="1825535"/>
             <a:ext cx="108000" cy="108000"/>
           </a:xfrm>
           <a:prstGeom prst="ellipse">
@@ -5337,7 +5337,7 @@
         </p:nvSpPr>
         <p:spPr>
           <a:xfrm>
-            <a:off x="10001144" y="2130335"/>
+            <a:off x="10001144" y="1825535"/>
             <a:ext cx="108000" cy="108000"/>
           </a:xfrm>
           <a:prstGeom prst="ellipse">
@@ -5389,7 +5389,7 @@
         </p:nvSpPr>
         <p:spPr>
           <a:xfrm>
-            <a:off x="10223394" y="2130335"/>
+            <a:off x="10223394" y="1825535"/>
             <a:ext cx="108000" cy="108000"/>
           </a:xfrm>
           <a:prstGeom prst="ellipse">
@@ -5441,7 +5441,7 @@
         </p:nvSpPr>
         <p:spPr>
           <a:xfrm>
-            <a:off x="10442468" y="2130335"/>
+            <a:off x="10442468" y="1825535"/>
             <a:ext cx="108000" cy="108000"/>
           </a:xfrm>
           <a:prstGeom prst="ellipse">
@@ -5493,7 +5493,7 @@
         </p:nvSpPr>
         <p:spPr>
           <a:xfrm>
-            <a:off x="10661542" y="2130335"/>
+            <a:off x="10661542" y="1825535"/>
             <a:ext cx="108000" cy="108000"/>
           </a:xfrm>
           <a:prstGeom prst="ellipse">
@@ -5545,7 +5545,7 @@
         </p:nvSpPr>
         <p:spPr>
           <a:xfrm>
-            <a:off x="10883792" y="2130335"/>
+            <a:off x="10883792" y="1825535"/>
             <a:ext cx="108000" cy="108000"/>
           </a:xfrm>
           <a:prstGeom prst="ellipse">
@@ -5597,7 +5597,7 @@
         </p:nvSpPr>
         <p:spPr>
           <a:xfrm>
-            <a:off x="11102866" y="2130335"/>
+            <a:off x="11102866" y="1825535"/>
             <a:ext cx="108000" cy="108000"/>
           </a:xfrm>
           <a:prstGeom prst="ellipse">
@@ -5649,7 +5649,7 @@
         </p:nvSpPr>
         <p:spPr>
           <a:xfrm>
-            <a:off x="4729022" y="304800"/>
+            <a:off x="4729022" y="0"/>
             <a:ext cx="2758191" cy="646331"/>
           </a:xfrm>
           <a:prstGeom prst="rect">
@@ -5688,7 +5688,7 @@
         </p:nvCxnSpPr>
         <p:spPr>
           <a:xfrm>
-            <a:off x="3892621" y="2238335"/>
+            <a:off x="3892621" y="1933535"/>
             <a:ext cx="0" cy="371443"/>
           </a:xfrm>
           <a:prstGeom prst="line">
@@ -5725,7 +5725,7 @@
         </p:nvCxnSpPr>
         <p:spPr>
           <a:xfrm>
-            <a:off x="4111695" y="2238335"/>
+            <a:off x="4111695" y="1933535"/>
             <a:ext cx="0" cy="371443"/>
           </a:xfrm>
           <a:prstGeom prst="line">
@@ -5762,7 +5762,7 @@
         </p:nvSpPr>
         <p:spPr>
           <a:xfrm>
-            <a:off x="2419454" y="2586528"/>
+            <a:off x="2419454" y="2281728"/>
             <a:ext cx="2949846" cy="400110"/>
           </a:xfrm>
           <a:prstGeom prst="rect">
@@ -5802,7 +5802,7 @@
         </p:nvCxnSpPr>
         <p:spPr>
           <a:xfrm>
-            <a:off x="3631484" y="2499366"/>
+            <a:off x="3631484" y="2194566"/>
             <a:ext cx="261034" cy="0"/>
           </a:xfrm>
           <a:prstGeom prst="straightConnector1">
@@ -5843,7 +5843,7 @@
         </p:nvCxnSpPr>
         <p:spPr>
           <a:xfrm flipH="1">
-            <a:off x="4113530" y="2499798"/>
+            <a:off x="4113530" y="2194998"/>
             <a:ext cx="258965" cy="0"/>
           </a:xfrm>
           <a:prstGeom prst="straightConnector1">
@@ -5884,7 +5884,7 @@
         </p:nvCxnSpPr>
         <p:spPr>
           <a:xfrm>
-            <a:off x="0" y="5383162"/>
+            <a:off x="0" y="5078362"/>
             <a:ext cx="12801600" cy="0"/>
           </a:xfrm>
           <a:prstGeom prst="straightConnector1">
@@ -5928,7 +5928,7 @@
         </p:nvCxnSpPr>
         <p:spPr>
           <a:xfrm>
-            <a:off x="3764819" y="4962730"/>
+            <a:off x="3783869" y="4619830"/>
             <a:ext cx="0" cy="425373"/>
           </a:xfrm>
           <a:prstGeom prst="straightConnector1">
@@ -5970,8 +5970,8 @@
         </p:nvSpPr>
         <p:spPr>
           <a:xfrm>
-            <a:off x="1986038" y="4546743"/>
-            <a:ext cx="3728906" cy="400110"/>
+            <a:off x="2927138" y="4241461"/>
+            <a:ext cx="1779654" cy="400110"/>
           </a:xfrm>
           <a:prstGeom prst="rect">
             <a:avLst/>
@@ -5991,17 +5991,83 @@
                 </a:solidFill>
                 <a:latin typeface="Helvetica" pitchFamily="2" charset="0"/>
               </a:rPr>
-              <a:t>Reference time (</a:t>
-            </a:r>
-            <a:r>
-              <a:rPr lang="en-US" sz="2000" i="1" dirty="0" err="1">
-                <a:solidFill>
-                  <a:srgbClr val="C00000"/>
-                </a:solidFill>
-                <a:latin typeface="Helvetica" pitchFamily="2" charset="0"/>
-              </a:rPr>
-              <a:t>kzdate</a:t>
-            </a:r>
+              <a:t>The reference</a:t>
+            </a:r>
+          </a:p>
+        </p:txBody>
+      </p:sp>
+      <p:cxnSp>
+        <p:nvCxnSpPr>
+          <p:cNvPr id="100" name="Straight Arrow Connector 99">
+            <a:extLst>
+              <a:ext uri="{FF2B5EF4-FFF2-40B4-BE49-F238E27FC236}">
+                <a16:creationId xmlns:a16="http://schemas.microsoft.com/office/drawing/2014/main" id="{C0341D9C-B293-004A-9E8C-2533F342FB7A}"/>
+              </a:ext>
+            </a:extLst>
+          </p:cNvPr>
+          <p:cNvCxnSpPr>
+            <a:cxnSpLocks/>
+          </p:cNvCxnSpPr>
+          <p:nvPr/>
+        </p:nvCxnSpPr>
+        <p:spPr>
+          <a:xfrm flipV="1">
+            <a:off x="807496" y="1933535"/>
+            <a:ext cx="0" cy="473045"/>
+          </a:xfrm>
+          <a:prstGeom prst="straightConnector1">
+            <a:avLst/>
+          </a:prstGeom>
+          <a:ln w="57150">
+            <a:solidFill>
+              <a:srgbClr val="C00000"/>
+            </a:solidFill>
+            <a:tailEnd type="triangle"/>
+          </a:ln>
+        </p:spPr>
+        <p:style>
+          <a:lnRef idx="1">
+            <a:schemeClr val="accent1"/>
+          </a:lnRef>
+          <a:fillRef idx="0">
+            <a:schemeClr val="accent1"/>
+          </a:fillRef>
+          <a:effectRef idx="0">
+            <a:schemeClr val="accent1"/>
+          </a:effectRef>
+          <a:fontRef idx="minor">
+            <a:schemeClr val="tx1"/>
+          </a:fontRef>
+        </p:style>
+      </p:cxnSp>
+      <p:sp>
+        <p:nvSpPr>
+          <p:cNvPr id="102" name="TextBox 101">
+            <a:extLst>
+              <a:ext uri="{FF2B5EF4-FFF2-40B4-BE49-F238E27FC236}">
+                <a16:creationId xmlns:a16="http://schemas.microsoft.com/office/drawing/2014/main" id="{2392CF72-8F8C-7D43-BD84-97C38F3ADFE1}"/>
+              </a:ext>
+            </a:extLst>
+          </p:cNvPr>
+          <p:cNvSpPr txBox="1"/>
+          <p:nvPr/>
+        </p:nvSpPr>
+        <p:spPr>
+          <a:xfrm>
+            <a:off x="620840" y="2453256"/>
+            <a:ext cx="1662635" cy="400110"/>
+          </a:xfrm>
+          <a:prstGeom prst="rect">
+            <a:avLst/>
+          </a:prstGeom>
+          <a:noFill/>
+        </p:spPr>
+        <p:txBody>
+          <a:bodyPr wrap="none" rtlCol="0">
+            <a:spAutoFit/>
+          </a:bodyPr>
+          <a:lstStyle/>
+          <a:p>
             <a:r>
               <a:rPr lang="en-US" sz="2000" i="1" dirty="0">
                 <a:solidFill>
@@ -6009,35 +6075,17 @@
                 </a:solidFill>
                 <a:latin typeface="Helvetica" pitchFamily="2" charset="0"/>
               </a:rPr>
-              <a:t> </a:t>
-            </a:r>
-            <a:r>
-              <a:rPr lang="en-US" sz="2000" i="1" dirty="0" err="1">
-                <a:solidFill>
-                  <a:srgbClr val="C00000"/>
-                </a:solidFill>
-                <a:latin typeface="Helvetica" pitchFamily="2" charset="0"/>
-              </a:rPr>
-              <a:t>kztime</a:t>
-            </a:r>
-            <a:r>
-              <a:rPr lang="en-US" sz="2000" i="1" dirty="0">
-                <a:solidFill>
-                  <a:srgbClr val="C00000"/>
-                </a:solidFill>
-                <a:latin typeface="Helvetica" pitchFamily="2" charset="0"/>
-              </a:rPr>
-              <a:t>)</a:t>
+              <a:t>start time (b)</a:t>
             </a:r>
           </a:p>
         </p:txBody>
       </p:sp>
       <p:cxnSp>
         <p:nvCxnSpPr>
-          <p:cNvPr id="100" name="Straight Arrow Connector 99">
-            <a:extLst>
-              <a:ext uri="{FF2B5EF4-FFF2-40B4-BE49-F238E27FC236}">
-                <a16:creationId xmlns:a16="http://schemas.microsoft.com/office/drawing/2014/main" id="{C0341D9C-B293-004A-9E8C-2533F342FB7A}"/>
+          <p:cNvPr id="103" name="Straight Arrow Connector 102">
+            <a:extLst>
+              <a:ext uri="{FF2B5EF4-FFF2-40B4-BE49-F238E27FC236}">
+                <a16:creationId xmlns:a16="http://schemas.microsoft.com/office/drawing/2014/main" id="{3E33038C-6A00-784E-A813-05418DE6460A}"/>
               </a:ext>
             </a:extLst>
           </p:cNvPr>
@@ -6048,7 +6096,7 @@
         </p:nvCxnSpPr>
         <p:spPr>
           <a:xfrm flipV="1">
-            <a:off x="807496" y="2238335"/>
+            <a:off x="11158117" y="1933534"/>
             <a:ext cx="0" cy="473045"/>
           </a:xfrm>
           <a:prstGeom prst="straightConnector1">
@@ -6078,10 +6126,10 @@
       </p:cxnSp>
       <p:sp>
         <p:nvSpPr>
-          <p:cNvPr id="102" name="TextBox 101">
-            <a:extLst>
-              <a:ext uri="{FF2B5EF4-FFF2-40B4-BE49-F238E27FC236}">
-                <a16:creationId xmlns:a16="http://schemas.microsoft.com/office/drawing/2014/main" id="{2392CF72-8F8C-7D43-BD84-97C38F3ADFE1}"/>
+          <p:cNvPr id="104" name="TextBox 103">
+            <a:extLst>
+              <a:ext uri="{FF2B5EF4-FFF2-40B4-BE49-F238E27FC236}">
+                <a16:creationId xmlns:a16="http://schemas.microsoft.com/office/drawing/2014/main" id="{032D55B1-4D8A-734A-AA9C-1B9671CE40EE}"/>
               </a:ext>
             </a:extLst>
           </p:cNvPr>
@@ -6090,91 +6138,7 @@
         </p:nvSpPr>
         <p:spPr>
           <a:xfrm>
-            <a:off x="620840" y="2758056"/>
-            <a:ext cx="1662635" cy="400110"/>
-          </a:xfrm>
-          <a:prstGeom prst="rect">
-            <a:avLst/>
-          </a:prstGeom>
-          <a:noFill/>
-        </p:spPr>
-        <p:txBody>
-          <a:bodyPr wrap="none" rtlCol="0">
-            <a:spAutoFit/>
-          </a:bodyPr>
-          <a:lstStyle/>
-          <a:p>
-            <a:r>
-              <a:rPr lang="en-US" sz="2000" i="1" dirty="0">
-                <a:solidFill>
-                  <a:srgbClr val="C00000"/>
-                </a:solidFill>
-                <a:latin typeface="Helvetica" pitchFamily="2" charset="0"/>
-              </a:rPr>
-              <a:t>Start time (b)</a:t>
-            </a:r>
-          </a:p>
-        </p:txBody>
-      </p:sp>
-      <p:cxnSp>
-        <p:nvCxnSpPr>
-          <p:cNvPr id="103" name="Straight Arrow Connector 102">
-            <a:extLst>
-              <a:ext uri="{FF2B5EF4-FFF2-40B4-BE49-F238E27FC236}">
-                <a16:creationId xmlns:a16="http://schemas.microsoft.com/office/drawing/2014/main" id="{3E33038C-6A00-784E-A813-05418DE6460A}"/>
-              </a:ext>
-            </a:extLst>
-          </p:cNvPr>
-          <p:cNvCxnSpPr>
-            <a:cxnSpLocks/>
-          </p:cNvCxnSpPr>
-          <p:nvPr/>
-        </p:nvCxnSpPr>
-        <p:spPr>
-          <a:xfrm flipV="1">
-            <a:off x="11158117" y="2238334"/>
-            <a:ext cx="0" cy="473045"/>
-          </a:xfrm>
-          <a:prstGeom prst="straightConnector1">
-            <a:avLst/>
-          </a:prstGeom>
-          <a:ln w="57150">
-            <a:solidFill>
-              <a:srgbClr val="C00000"/>
-            </a:solidFill>
-            <a:tailEnd type="triangle"/>
-          </a:ln>
-        </p:spPr>
-        <p:style>
-          <a:lnRef idx="1">
-            <a:schemeClr val="accent1"/>
-          </a:lnRef>
-          <a:fillRef idx="0">
-            <a:schemeClr val="accent1"/>
-          </a:fillRef>
-          <a:effectRef idx="0">
-            <a:schemeClr val="accent1"/>
-          </a:effectRef>
-          <a:fontRef idx="minor">
-            <a:schemeClr val="tx1"/>
-          </a:fontRef>
-        </p:style>
-      </p:cxnSp>
-      <p:sp>
-        <p:nvSpPr>
-          <p:cNvPr id="104" name="TextBox 103">
-            <a:extLst>
-              <a:ext uri="{FF2B5EF4-FFF2-40B4-BE49-F238E27FC236}">
-                <a16:creationId xmlns:a16="http://schemas.microsoft.com/office/drawing/2014/main" id="{032D55B1-4D8A-734A-AA9C-1B9671CE40EE}"/>
-              </a:ext>
-            </a:extLst>
-          </p:cNvPr>
-          <p:cNvSpPr txBox="1"/>
-          <p:nvPr/>
-        </p:nvSpPr>
-        <p:spPr>
-          <a:xfrm>
-            <a:off x="9777686" y="2711379"/>
+            <a:off x="9871462" y="2443683"/>
             <a:ext cx="1550424" cy="400110"/>
           </a:xfrm>
           <a:prstGeom prst="rect">
@@ -6216,7 +6180,7 @@
         </p:nvCxnSpPr>
         <p:spPr>
           <a:xfrm>
-            <a:off x="-25458" y="4104968"/>
+            <a:off x="-25458" y="3800168"/>
             <a:ext cx="12827058" cy="0"/>
           </a:xfrm>
           <a:prstGeom prst="straightConnector1">
@@ -6260,7 +6224,7 @@
         </p:nvCxnSpPr>
         <p:spPr>
           <a:xfrm flipV="1">
-            <a:off x="3764819" y="4128198"/>
+            <a:off x="3783869" y="3842448"/>
             <a:ext cx="318" cy="408466"/>
           </a:xfrm>
           <a:prstGeom prst="straightConnector1">
@@ -6302,7 +6266,7 @@
         </p:nvSpPr>
         <p:spPr>
           <a:xfrm>
-            <a:off x="3778882" y="4089149"/>
+            <a:off x="3778882" y="3784349"/>
             <a:ext cx="797013" cy="400110"/>
           </a:xfrm>
           <a:prstGeom prst="rect">
@@ -6344,7 +6308,7 @@
         </p:nvCxnSpPr>
         <p:spPr>
           <a:xfrm flipV="1">
-            <a:off x="6425928" y="2218599"/>
+            <a:off x="6425928" y="1913799"/>
             <a:ext cx="0" cy="473045"/>
           </a:xfrm>
           <a:prstGeom prst="straightConnector1">
@@ -6386,8 +6350,8 @@
         </p:nvSpPr>
         <p:spPr>
           <a:xfrm>
-            <a:off x="5311155" y="2758056"/>
-            <a:ext cx="2770310" cy="400110"/>
+            <a:off x="5311155" y="2453256"/>
+            <a:ext cx="3902030" cy="400110"/>
           </a:xfrm>
           <a:prstGeom prst="rect">
             <a:avLst/>
@@ -6425,7 +6389,7 @@
                 </a:solidFill>
                 <a:latin typeface="Helvetica" pitchFamily="2" charset="0"/>
               </a:rPr>
-              <a:t>* (e.g., t3)</a:t>
+              <a:t>* (e.g., t0, t1 , t?, ...)</a:t>
             </a:r>
           </a:p>
         </p:txBody>
@@ -6444,7 +6408,7 @@
         </p:nvSpPr>
         <p:spPr>
           <a:xfrm rot="5400000">
-            <a:off x="5790183" y="-3337991"/>
+            <a:off x="5790183" y="-3642791"/>
             <a:ext cx="400111" cy="10411743"/>
           </a:xfrm>
           <a:prstGeom prst="leftBrace">
@@ -6496,7 +6460,7 @@
         </p:nvSpPr>
         <p:spPr>
           <a:xfrm>
-            <a:off x="8069788" y="1309058"/>
+            <a:off x="8069788" y="1004258"/>
             <a:ext cx="3062057" cy="400110"/>
           </a:xfrm>
           <a:prstGeom prst="rect">
@@ -6538,7 +6502,7 @@
         </p:nvCxnSpPr>
         <p:spPr>
           <a:xfrm flipV="1">
-            <a:off x="810199" y="3111490"/>
+            <a:off x="810199" y="2806690"/>
             <a:ext cx="0" cy="2263315"/>
           </a:xfrm>
           <a:prstGeom prst="straightConnector1">
@@ -6582,7 +6546,7 @@
         </p:nvSpPr>
         <p:spPr>
           <a:xfrm>
-            <a:off x="148895" y="1350401"/>
+            <a:off x="148895" y="1045601"/>
             <a:ext cx="5786584" cy="461665"/>
           </a:xfrm>
           <a:prstGeom prst="rect">
@@ -6619,7 +6583,7 @@
         </p:nvSpPr>
         <p:spPr>
           <a:xfrm>
-            <a:off x="178392" y="5752780"/>
+            <a:off x="178392" y="5447980"/>
             <a:ext cx="2982932" cy="461665"/>
           </a:xfrm>
           <a:prstGeom prst="rect">
@@ -6656,7 +6620,7 @@
         </p:nvSpPr>
         <p:spPr>
           <a:xfrm>
-            <a:off x="182696" y="4104968"/>
+            <a:off x="182696" y="3800168"/>
             <a:ext cx="2848280" cy="461665"/>
           </a:xfrm>
           <a:prstGeom prst="rect">
@@ -6695,7 +6659,7 @@
         </p:nvCxnSpPr>
         <p:spPr>
           <a:xfrm flipV="1">
-            <a:off x="11160819" y="3119847"/>
+            <a:off x="11160819" y="2815047"/>
             <a:ext cx="0" cy="2263315"/>
           </a:xfrm>
           <a:prstGeom prst="straightConnector1">
@@ -6741,7 +6705,7 @@
         </p:nvCxnSpPr>
         <p:spPr>
           <a:xfrm flipV="1">
-            <a:off x="6425928" y="3111489"/>
+            <a:off x="6425928" y="2806689"/>
             <a:ext cx="0" cy="2263315"/>
           </a:xfrm>
           <a:prstGeom prst="straightConnector1">
@@ -6785,8 +6749,8 @@
         </p:nvSpPr>
         <p:spPr>
           <a:xfrm>
-            <a:off x="5033909" y="5385925"/>
-            <a:ext cx="3163045" cy="400110"/>
+            <a:off x="5033909" y="5081125"/>
+            <a:ext cx="3062057" cy="400110"/>
           </a:xfrm>
           <a:prstGeom prst="rect">
             <a:avLst/>
@@ -6806,39 +6770,17 @@
                 </a:solidFill>
                 <a:latin typeface="Helvetica" pitchFamily="2" charset="0"/>
               </a:rPr>
-              <a:t>(e.g., reference time + t3)</a:t>
-            </a:r>
-          </a:p>
-        </p:txBody>
-      </p:sp>
-      <p:sp>
-        <p:nvSpPr>
-          <p:cNvPr id="129" name="TextBox 128">
-            <a:extLst>
-              <a:ext uri="{FF2B5EF4-FFF2-40B4-BE49-F238E27FC236}">
-                <a16:creationId xmlns:a16="http://schemas.microsoft.com/office/drawing/2014/main" id="{43681021-FC24-5541-860F-70253CB67F80}"/>
-              </a:ext>
-            </a:extLst>
-          </p:cNvPr>
-          <p:cNvSpPr txBox="1"/>
-          <p:nvPr/>
-        </p:nvSpPr>
-        <p:spPr>
-          <a:xfrm>
-            <a:off x="10055144" y="5391519"/>
-            <a:ext cx="2254143" cy="400110"/>
-          </a:xfrm>
-          <a:prstGeom prst="rect">
-            <a:avLst/>
-          </a:prstGeom>
-          <a:noFill/>
-        </p:spPr>
-        <p:txBody>
-          <a:bodyPr wrap="none" rtlCol="0">
-            <a:spAutoFit/>
-          </a:bodyPr>
-          <a:lstStyle/>
-          <a:p>
+              <a:t>e.g., (</a:t>
+            </a:r>
+            <a:r>
+              <a:rPr lang="en-US" sz="2000" i="1" dirty="0" err="1">
+                <a:solidFill>
+                  <a:srgbClr val="C00000"/>
+                </a:solidFill>
+                <a:latin typeface="Helvetica" pitchFamily="2" charset="0"/>
+              </a:rPr>
+              <a:t>kzdate</a:t>
+            </a:r>
             <a:r>
               <a:rPr lang="en-US" sz="2000" i="1" dirty="0">
                 <a:solidFill>
@@ -6846,39 +6788,17 @@
                 </a:solidFill>
                 <a:latin typeface="Helvetica" pitchFamily="2" charset="0"/>
               </a:rPr>
-              <a:t>reference time + e</a:t>
-            </a:r>
-          </a:p>
-        </p:txBody>
-      </p:sp>
-      <p:sp>
-        <p:nvSpPr>
-          <p:cNvPr id="130" name="TextBox 129">
-            <a:extLst>
-              <a:ext uri="{FF2B5EF4-FFF2-40B4-BE49-F238E27FC236}">
-                <a16:creationId xmlns:a16="http://schemas.microsoft.com/office/drawing/2014/main" id="{4A615E3D-9A28-254A-B701-B66454B8E0D7}"/>
-              </a:ext>
-            </a:extLst>
-          </p:cNvPr>
-          <p:cNvSpPr txBox="1"/>
-          <p:nvPr/>
-        </p:nvSpPr>
-        <p:spPr>
-          <a:xfrm>
-            <a:off x="124590" y="5392459"/>
-            <a:ext cx="2254143" cy="400110"/>
-          </a:xfrm>
-          <a:prstGeom prst="rect">
-            <a:avLst/>
-          </a:prstGeom>
-          <a:noFill/>
-        </p:spPr>
-        <p:txBody>
-          <a:bodyPr wrap="none" rtlCol="0">
-            <a:spAutoFit/>
-          </a:bodyPr>
-          <a:lstStyle/>
-          <a:p>
+              <a:t>, </a:t>
+            </a:r>
+            <a:r>
+              <a:rPr lang="en-US" sz="2000" i="1" dirty="0" err="1">
+                <a:solidFill>
+                  <a:srgbClr val="C00000"/>
+                </a:solidFill>
+                <a:latin typeface="Helvetica" pitchFamily="2" charset="0"/>
+              </a:rPr>
+              <a:t>kztime</a:t>
+            </a:r>
             <a:r>
               <a:rPr lang="en-US" sz="2000" i="1" dirty="0">
                 <a:solidFill>
@@ -6886,17 +6806,17 @@
                 </a:solidFill>
                 <a:latin typeface="Helvetica" pitchFamily="2" charset="0"/>
               </a:rPr>
-              <a:t>reference time + b</a:t>
-            </a:r>
-          </a:p>
-        </p:txBody>
-      </p:sp>
-      <p:sp>
-        <p:nvSpPr>
-          <p:cNvPr id="136" name="TextBox 135">
-            <a:extLst>
-              <a:ext uri="{FF2B5EF4-FFF2-40B4-BE49-F238E27FC236}">
-                <a16:creationId xmlns:a16="http://schemas.microsoft.com/office/drawing/2014/main" id="{0CC9AFBB-9365-464E-A2A6-70D7C927D32C}"/>
+              <a:t>) + t?</a:t>
+            </a:r>
+          </a:p>
+        </p:txBody>
+      </p:sp>
+      <p:sp>
+        <p:nvSpPr>
+          <p:cNvPr id="129" name="TextBox 128">
+            <a:extLst>
+              <a:ext uri="{FF2B5EF4-FFF2-40B4-BE49-F238E27FC236}">
+                <a16:creationId xmlns:a16="http://schemas.microsoft.com/office/drawing/2014/main" id="{43681021-FC24-5541-860F-70253CB67F80}"/>
               </a:ext>
             </a:extLst>
           </p:cNvPr>
@@ -6905,8 +6825,8 @@
         </p:nvSpPr>
         <p:spPr>
           <a:xfrm>
-            <a:off x="178392" y="6661356"/>
-            <a:ext cx="8313430" cy="461665"/>
+            <a:off x="10055144" y="5086719"/>
+            <a:ext cx="2424062" cy="400110"/>
           </a:xfrm>
           <a:prstGeom prst="rect">
             <a:avLst/>
@@ -6920,11 +6840,243 @@
           <a:lstStyle/>
           <a:p>
             <a:r>
-              <a:rPr lang="en-US" sz="2400" b="1" i="1" dirty="0">
+              <a:rPr lang="en-US" sz="2000" i="1" dirty="0">
+                <a:solidFill>
+                  <a:srgbClr val="C00000"/>
+                </a:solidFill>
                 <a:latin typeface="Helvetica" pitchFamily="2" charset="0"/>
               </a:rPr>
-              <a:t>Absolute time = Absolute reference time + Relative time</a:t>
-            </a:r>
+              <a:t>(</a:t>
+            </a:r>
+            <a:r>
+              <a:rPr lang="en-US" sz="2000" i="1" dirty="0" err="1">
+                <a:solidFill>
+                  <a:srgbClr val="C00000"/>
+                </a:solidFill>
+                <a:latin typeface="Helvetica" pitchFamily="2" charset="0"/>
+              </a:rPr>
+              <a:t>kzdate</a:t>
+            </a:r>
+            <a:r>
+              <a:rPr lang="en-US" sz="2000" i="1" dirty="0">
+                <a:solidFill>
+                  <a:srgbClr val="C00000"/>
+                </a:solidFill>
+                <a:latin typeface="Helvetica" pitchFamily="2" charset="0"/>
+              </a:rPr>
+              <a:t>, </a:t>
+            </a:r>
+            <a:r>
+              <a:rPr lang="en-US" sz="2000" i="1" dirty="0" err="1">
+                <a:solidFill>
+                  <a:srgbClr val="C00000"/>
+                </a:solidFill>
+                <a:latin typeface="Helvetica" pitchFamily="2" charset="0"/>
+              </a:rPr>
+              <a:t>kztime</a:t>
+            </a:r>
+            <a:r>
+              <a:rPr lang="en-US" sz="2000" i="1" dirty="0">
+                <a:solidFill>
+                  <a:srgbClr val="C00000"/>
+                </a:solidFill>
+                <a:latin typeface="Helvetica" pitchFamily="2" charset="0"/>
+              </a:rPr>
+              <a:t>) + e</a:t>
+            </a:r>
+          </a:p>
+        </p:txBody>
+      </p:sp>
+      <p:sp>
+        <p:nvSpPr>
+          <p:cNvPr id="130" name="TextBox 129">
+            <a:extLst>
+              <a:ext uri="{FF2B5EF4-FFF2-40B4-BE49-F238E27FC236}">
+                <a16:creationId xmlns:a16="http://schemas.microsoft.com/office/drawing/2014/main" id="{4A615E3D-9A28-254A-B701-B66454B8E0D7}"/>
+              </a:ext>
+            </a:extLst>
+          </p:cNvPr>
+          <p:cNvSpPr txBox="1"/>
+          <p:nvPr/>
+        </p:nvSpPr>
+        <p:spPr>
+          <a:xfrm>
+            <a:off x="124590" y="5087659"/>
+            <a:ext cx="2424062" cy="400110"/>
+          </a:xfrm>
+          <a:prstGeom prst="rect">
+            <a:avLst/>
+          </a:prstGeom>
+          <a:noFill/>
+        </p:spPr>
+        <p:txBody>
+          <a:bodyPr wrap="none" rtlCol="0">
+            <a:spAutoFit/>
+          </a:bodyPr>
+          <a:lstStyle/>
+          <a:p>
+            <a:r>
+              <a:rPr lang="en-US" sz="2000" i="1" dirty="0">
+                <a:solidFill>
+                  <a:srgbClr val="C00000"/>
+                </a:solidFill>
+                <a:latin typeface="Helvetica" pitchFamily="2" charset="0"/>
+              </a:rPr>
+              <a:t>(</a:t>
+            </a:r>
+            <a:r>
+              <a:rPr lang="en-US" sz="2000" i="1" dirty="0" err="1">
+                <a:solidFill>
+                  <a:srgbClr val="C00000"/>
+                </a:solidFill>
+                <a:latin typeface="Helvetica" pitchFamily="2" charset="0"/>
+              </a:rPr>
+              <a:t>kzdate</a:t>
+            </a:r>
+            <a:r>
+              <a:rPr lang="en-US" sz="2000" i="1" dirty="0">
+                <a:solidFill>
+                  <a:srgbClr val="C00000"/>
+                </a:solidFill>
+                <a:latin typeface="Helvetica" pitchFamily="2" charset="0"/>
+              </a:rPr>
+              <a:t>, </a:t>
+            </a:r>
+            <a:r>
+              <a:rPr lang="en-US" sz="2000" i="1" dirty="0" err="1">
+                <a:solidFill>
+                  <a:srgbClr val="C00000"/>
+                </a:solidFill>
+                <a:latin typeface="Helvetica" pitchFamily="2" charset="0"/>
+              </a:rPr>
+              <a:t>kztime</a:t>
+            </a:r>
+            <a:r>
+              <a:rPr lang="en-US" sz="2000" i="1" dirty="0">
+                <a:solidFill>
+                  <a:srgbClr val="C00000"/>
+                </a:solidFill>
+                <a:latin typeface="Helvetica" pitchFamily="2" charset="0"/>
+              </a:rPr>
+              <a:t>) + b</a:t>
+            </a:r>
+          </a:p>
+        </p:txBody>
+      </p:sp>
+      <p:sp>
+        <p:nvSpPr>
+          <p:cNvPr id="136" name="TextBox 135">
+            <a:extLst>
+              <a:ext uri="{FF2B5EF4-FFF2-40B4-BE49-F238E27FC236}">
+                <a16:creationId xmlns:a16="http://schemas.microsoft.com/office/drawing/2014/main" id="{0CC9AFBB-9365-464E-A2A6-70D7C927D32C}"/>
+              </a:ext>
+            </a:extLst>
+          </p:cNvPr>
+          <p:cNvSpPr txBox="1"/>
+          <p:nvPr/>
+        </p:nvSpPr>
+        <p:spPr>
+          <a:xfrm>
+            <a:off x="2473273" y="6258741"/>
+            <a:ext cx="8376011" cy="461665"/>
+          </a:xfrm>
+          <a:prstGeom prst="rect">
+            <a:avLst/>
+          </a:prstGeom>
+          <a:noFill/>
+          <a:ln w="12700">
+            <a:solidFill>
+              <a:schemeClr val="tx1">
+                <a:lumMod val="75000"/>
+                <a:lumOff val="25000"/>
+              </a:schemeClr>
+            </a:solidFill>
+          </a:ln>
+        </p:spPr>
+        <p:txBody>
+          <a:bodyPr wrap="none" rtlCol="0">
+            <a:spAutoFit/>
+          </a:bodyPr>
+          <a:lstStyle/>
+          <a:p>
+            <a:r>
+              <a:rPr lang="en-US" sz="2400" i="1" dirty="0">
+                <a:solidFill>
+                  <a:srgbClr val="C00000"/>
+                </a:solidFill>
+                <a:latin typeface="Helvetica" pitchFamily="2" charset="0"/>
+              </a:rPr>
+              <a:t>Absolute time of </a:t>
+            </a:r>
+            <a:r>
+              <a:rPr lang="en-US" sz="2400" i="1" dirty="0" err="1">
+                <a:solidFill>
+                  <a:srgbClr val="C00000"/>
+                </a:solidFill>
+                <a:latin typeface="Helvetica" pitchFamily="2" charset="0"/>
+              </a:rPr>
+              <a:t>sth</a:t>
+            </a:r>
+            <a:r>
+              <a:rPr lang="en-US" sz="2400" i="1" dirty="0">
+                <a:solidFill>
+                  <a:srgbClr val="C00000"/>
+                </a:solidFill>
+                <a:latin typeface="Helvetica" pitchFamily="2" charset="0"/>
+              </a:rPr>
+              <a:t> = (</a:t>
+            </a:r>
+            <a:r>
+              <a:rPr lang="en-US" sz="2400" i="1" dirty="0" err="1">
+                <a:solidFill>
+                  <a:srgbClr val="C00000"/>
+                </a:solidFill>
+                <a:latin typeface="Helvetica" pitchFamily="2" charset="0"/>
+              </a:rPr>
+              <a:t>kzdate</a:t>
+            </a:r>
+            <a:r>
+              <a:rPr lang="en-US" sz="2400" i="1" dirty="0">
+                <a:solidFill>
+                  <a:srgbClr val="C00000"/>
+                </a:solidFill>
+                <a:latin typeface="Helvetica" pitchFamily="2" charset="0"/>
+              </a:rPr>
+              <a:t>, </a:t>
+            </a:r>
+            <a:r>
+              <a:rPr lang="en-US" sz="2400" i="1" dirty="0" err="1">
+                <a:solidFill>
+                  <a:srgbClr val="C00000"/>
+                </a:solidFill>
+                <a:latin typeface="Helvetica" pitchFamily="2" charset="0"/>
+              </a:rPr>
+              <a:t>kztime</a:t>
+            </a:r>
+            <a:r>
+              <a:rPr lang="en-US" sz="2400" i="1" dirty="0">
+                <a:solidFill>
+                  <a:srgbClr val="C00000"/>
+                </a:solidFill>
+                <a:latin typeface="Helvetica" pitchFamily="2" charset="0"/>
+              </a:rPr>
+              <a:t>) + Relative time of </a:t>
+            </a:r>
+            <a:r>
+              <a:rPr lang="en-US" sz="2400" i="1" dirty="0" err="1">
+                <a:solidFill>
+                  <a:srgbClr val="C00000"/>
+                </a:solidFill>
+                <a:latin typeface="Helvetica" pitchFamily="2" charset="0"/>
+              </a:rPr>
+              <a:t>sth</a:t>
+            </a:r>
+            <a:endParaRPr lang="en-US" sz="2400" i="1" dirty="0">
+              <a:solidFill>
+                <a:srgbClr val="C00000"/>
+              </a:solidFill>
+              <a:latin typeface="Helvetica" pitchFamily="2" charset="0"/>
+            </a:endParaRPr>
           </a:p>
         </p:txBody>
       </p:sp>
@@ -6942,7 +7094,7 @@
         </p:nvSpPr>
         <p:spPr>
           <a:xfrm>
-            <a:off x="124590" y="7470865"/>
+            <a:off x="124590" y="7166065"/>
             <a:ext cx="11876910" cy="1323439"/>
           </a:xfrm>
           <a:prstGeom prst="rect">
@@ -7067,6 +7219,82 @@
               </a:solidFill>
               <a:latin typeface="Helvetica" pitchFamily="2" charset="0"/>
             </a:endParaRPr>
+          </a:p>
+        </p:txBody>
+      </p:sp>
+      <p:sp>
+        <p:nvSpPr>
+          <p:cNvPr id="2" name="Rectangle 1">
+            <a:extLst>
+              <a:ext uri="{FF2B5EF4-FFF2-40B4-BE49-F238E27FC236}">
+                <a16:creationId xmlns:a16="http://schemas.microsoft.com/office/drawing/2014/main" id="{2BE72DB3-CBB0-E74D-B3E8-C1F9E1F9109E}"/>
+              </a:ext>
+            </a:extLst>
+          </p:cNvPr>
+          <p:cNvSpPr/>
+          <p:nvPr/>
+        </p:nvSpPr>
+        <p:spPr>
+          <a:xfrm>
+            <a:off x="2930798" y="5093320"/>
+            <a:ext cx="1813317" cy="369332"/>
+          </a:xfrm>
+          <a:prstGeom prst="rect">
+            <a:avLst/>
+          </a:prstGeom>
+        </p:spPr>
+        <p:txBody>
+          <a:bodyPr wrap="none">
+            <a:spAutoFit/>
+          </a:bodyPr>
+          <a:lstStyle/>
+          <a:p>
+            <a:r>
+              <a:rPr lang="en-US" i="1" dirty="0">
+                <a:solidFill>
+                  <a:srgbClr val="C00000"/>
+                </a:solidFill>
+                <a:latin typeface="Helvetica" pitchFamily="2" charset="0"/>
+              </a:rPr>
+              <a:t>(</a:t>
+            </a:r>
+            <a:r>
+              <a:rPr lang="en-US" i="1" dirty="0" err="1">
+                <a:solidFill>
+                  <a:srgbClr val="C00000"/>
+                </a:solidFill>
+                <a:latin typeface="Helvetica" pitchFamily="2" charset="0"/>
+              </a:rPr>
+              <a:t>kzdate</a:t>
+            </a:r>
+            <a:r>
+              <a:rPr lang="en-US" i="1" dirty="0">
+                <a:solidFill>
+                  <a:srgbClr val="C00000"/>
+                </a:solidFill>
+                <a:latin typeface="Helvetica" pitchFamily="2" charset="0"/>
+              </a:rPr>
+              <a:t>, </a:t>
+            </a:r>
+            <a:r>
+              <a:rPr lang="en-US" i="1" dirty="0" err="1">
+                <a:solidFill>
+                  <a:srgbClr val="C00000"/>
+                </a:solidFill>
+                <a:latin typeface="Helvetica" pitchFamily="2" charset="0"/>
+              </a:rPr>
+              <a:t>kztime</a:t>
+            </a:r>
+            <a:r>
+              <a:rPr lang="en-US" i="1" dirty="0">
+                <a:solidFill>
+                  <a:srgbClr val="C00000"/>
+                </a:solidFill>
+                <a:latin typeface="Helvetica" pitchFamily="2" charset="0"/>
+              </a:rPr>
+              <a:t>)</a:t>
+            </a:r>
+            <a:endParaRPr lang="en-US" dirty="0"/>
           </a:p>
         </p:txBody>
       </p:sp>

</xml_diff>